<commit_message>
Aggiunto l'esempio del parallelepipedo.
</commit_message>
<xml_diff>
--- a/minecraft/uso_delle_coordinate.pptx
+++ b/minecraft/uso_delle_coordinate.pptx
@@ -9,6 +9,7 @@
     <p:sldId id="257" r:id="rId4"/>
     <p:sldId id="258" r:id="rId5"/>
     <p:sldId id="259" r:id="rId6"/>
+    <p:sldId id="260" r:id="rId7"/>
   </p:sldIdLst>
   <p:sldSz cx="10080625" cy="7559675"/>
   <p:notesSz cx="7559675" cy="10691812"/>
@@ -1599,21 +1600,7 @@
                 </a:uFill>
                 <a:latin typeface="Arial"/>
               </a:rPr>
-              <a:t>Fai clic per modificare il formato del testo della </a:t>
-            </a:r>
-            <a:r>
-              <a:rPr b="0" lang="it-IT" sz="3200" spc="-1" strike="noStrike">
-                <a:solidFill>
-                  <a:srgbClr val="000000"/>
-                </a:solidFill>
-                <a:uFill>
-                  <a:solidFill>
-                    <a:srgbClr val="ffffff"/>
-                  </a:solidFill>
-                </a:uFill>
-                <a:latin typeface="Arial"/>
-              </a:rPr>
-              <a:t>struttura</a:t>
+              <a:t>Fai clic per modificare il formato del testo della struttura</a:t>
             </a:r>
             <a:endParaRPr b="0" lang="it-IT" sz="3200" spc="-1" strike="noStrike">
               <a:solidFill>
@@ -1963,7 +1950,7 @@
           <a:bodyPr lIns="0" rIns="0" tIns="0" bIns="0"/>
           <a:p>
             <a:pPr algn="r"/>
-            <a:fld id="{ECACD687-57ED-4033-A515-B1EF5D1E9AE6}" type="slidenum">
+            <a:fld id="{6E1A1DD8-FB1C-4619-9E20-DDD401F95225}" type="slidenum">
               <a:rPr b="0" lang="it-IT" sz="1400" spc="-1" strike="noStrike">
                 <a:solidFill>
                   <a:srgbClr val="000000"/>
@@ -2116,7 +2103,7 @@
               </a:rPr>
               <a:t>Come usare le coordinate</a:t>
             </a:r>
-            <a:endParaRPr b="0" lang="it-IT" sz="4000" spc="-1" strike="noStrike">
+            <a:endParaRPr b="0" lang="it-IT" sz="3200" spc="-1" strike="noStrike">
               <a:solidFill>
                 <a:srgbClr val="000000"/>
               </a:solidFill>
@@ -2144,7 +2131,7 @@
               </a:rPr>
               <a:t>per disegnare</a:t>
             </a:r>
-            <a:endParaRPr b="0" lang="it-IT" sz="4000" spc="-1" strike="noStrike">
+            <a:endParaRPr b="0" lang="it-IT" sz="3200" spc="-1" strike="noStrike">
               <a:solidFill>
                 <a:srgbClr val="000000"/>
               </a:solidFill>
@@ -2219,8 +2206,8 @@
         </p:blipFill>
         <p:spPr>
           <a:xfrm>
-            <a:off x="1881720" y="432000"/>
-            <a:ext cx="6152040" cy="6480000"/>
+            <a:off x="2068920" y="1527480"/>
+            <a:ext cx="5444640" cy="5734800"/>
           </a:xfrm>
           <a:prstGeom prst="rect">
             <a:avLst/>
@@ -2230,6 +2217,57 @@
           </a:ln>
         </p:spPr>
       </p:pic>
+      <p:sp>
+        <p:nvSpPr>
+          <p:cNvPr id="42" name="TextShape 1"/>
+          <p:cNvSpPr txBox="1"/>
+          <p:nvPr/>
+        </p:nvSpPr>
+        <p:spPr>
+          <a:xfrm>
+            <a:off x="504000" y="301320"/>
+            <a:ext cx="9071640" cy="1262160"/>
+          </a:xfrm>
+          <a:prstGeom prst="rect">
+            <a:avLst/>
+          </a:prstGeom>
+          <a:noFill/>
+          <a:ln>
+            <a:noFill/>
+          </a:ln>
+        </p:spPr>
+        <p:txBody>
+          <a:bodyPr lIns="0" rIns="0" tIns="0" bIns="0" anchor="ctr"/>
+          <a:p>
+            <a:pPr algn="ctr"/>
+            <a:r>
+              <a:rPr b="0" lang="it-IT" sz="4400" spc="-1" strike="noStrike">
+                <a:solidFill>
+                  <a:srgbClr val="000000"/>
+                </a:solidFill>
+                <a:uFill>
+                  <a:solidFill>
+                    <a:srgbClr val="ffffff"/>
+                  </a:solidFill>
+                </a:uFill>
+                <a:latin typeface="Arial"/>
+              </a:rPr>
+              <a:t>Muro sul piano x</a:t>
+            </a:r>
+            <a:endParaRPr b="0" lang="it-IT" sz="4400" spc="-1" strike="noStrike">
+              <a:solidFill>
+                <a:srgbClr val="000000"/>
+              </a:solidFill>
+              <a:uFill>
+                <a:solidFill>
+                  <a:srgbClr val="ffffff"/>
+                </a:solidFill>
+              </a:uFill>
+              <a:latin typeface="Arial"/>
+            </a:endParaRPr>
+          </a:p>
+        </p:txBody>
+      </p:sp>
     </p:spTree>
   </p:cSld>
   <p:timing>
@@ -2281,7 +2319,7 @@
       </p:grpSpPr>
       <p:pic>
         <p:nvPicPr>
-          <p:cNvPr id="42" name="" descr=""/>
+          <p:cNvPr id="43" name="" descr=""/>
           <p:cNvPicPr/>
           <p:nvPr/>
         </p:nvPicPr>
@@ -2291,8 +2329,8 @@
         </p:blipFill>
         <p:spPr>
           <a:xfrm>
-            <a:off x="1765440" y="360000"/>
-            <a:ext cx="6658560" cy="6768000"/>
+            <a:off x="2198880" y="1588680"/>
+            <a:ext cx="5555880" cy="5647320"/>
           </a:xfrm>
           <a:prstGeom prst="rect">
             <a:avLst/>
@@ -2302,6 +2340,57 @@
           </a:ln>
         </p:spPr>
       </p:pic>
+      <p:sp>
+        <p:nvSpPr>
+          <p:cNvPr id="44" name="TextShape 1"/>
+          <p:cNvSpPr txBox="1"/>
+          <p:nvPr/>
+        </p:nvSpPr>
+        <p:spPr>
+          <a:xfrm>
+            <a:off x="504000" y="301320"/>
+            <a:ext cx="9071640" cy="1262160"/>
+          </a:xfrm>
+          <a:prstGeom prst="rect">
+            <a:avLst/>
+          </a:prstGeom>
+          <a:noFill/>
+          <a:ln>
+            <a:noFill/>
+          </a:ln>
+        </p:spPr>
+        <p:txBody>
+          <a:bodyPr lIns="0" rIns="0" tIns="0" bIns="0" anchor="ctr"/>
+          <a:p>
+            <a:pPr algn="ctr"/>
+            <a:r>
+              <a:rPr b="0" lang="it-IT" sz="4400" spc="-1" strike="noStrike">
+                <a:solidFill>
+                  <a:srgbClr val="000000"/>
+                </a:solidFill>
+                <a:uFill>
+                  <a:solidFill>
+                    <a:srgbClr val="ffffff"/>
+                  </a:solidFill>
+                </a:uFill>
+                <a:latin typeface="Arial"/>
+              </a:rPr>
+              <a:t>Muro sul piano z</a:t>
+            </a:r>
+            <a:endParaRPr b="0" lang="it-IT" sz="4400" spc="-1" strike="noStrike">
+              <a:solidFill>
+                <a:srgbClr val="000000"/>
+              </a:solidFill>
+              <a:uFill>
+                <a:solidFill>
+                  <a:srgbClr val="ffffff"/>
+                </a:solidFill>
+              </a:uFill>
+              <a:latin typeface="Arial"/>
+            </a:endParaRPr>
+          </a:p>
+        </p:txBody>
+      </p:sp>
     </p:spTree>
   </p:cSld>
   <p:timing>
@@ -2353,7 +2442,7 @@
       </p:grpSpPr>
       <p:pic>
         <p:nvPicPr>
-          <p:cNvPr id="43" name="" descr=""/>
+          <p:cNvPr id="45" name="" descr=""/>
           <p:cNvPicPr/>
           <p:nvPr/>
         </p:nvPicPr>
@@ -2363,8 +2452,8 @@
         </p:blipFill>
         <p:spPr>
           <a:xfrm>
-            <a:off x="1800000" y="504000"/>
-            <a:ext cx="6204240" cy="6521040"/>
+            <a:off x="2233800" y="1660680"/>
+            <a:ext cx="5326200" cy="5598360"/>
           </a:xfrm>
           <a:prstGeom prst="rect">
             <a:avLst/>
@@ -2374,6 +2463,57 @@
           </a:ln>
         </p:spPr>
       </p:pic>
+      <p:sp>
+        <p:nvSpPr>
+          <p:cNvPr id="46" name="TextShape 1"/>
+          <p:cNvSpPr txBox="1"/>
+          <p:nvPr/>
+        </p:nvSpPr>
+        <p:spPr>
+          <a:xfrm>
+            <a:off x="504000" y="301320"/>
+            <a:ext cx="9071640" cy="1262160"/>
+          </a:xfrm>
+          <a:prstGeom prst="rect">
+            <a:avLst/>
+          </a:prstGeom>
+          <a:noFill/>
+          <a:ln>
+            <a:noFill/>
+          </a:ln>
+        </p:spPr>
+        <p:txBody>
+          <a:bodyPr lIns="0" rIns="0" tIns="0" bIns="0" anchor="ctr"/>
+          <a:p>
+            <a:pPr algn="ctr"/>
+            <a:r>
+              <a:rPr b="0" lang="it-IT" sz="4400" spc="-1" strike="noStrike">
+                <a:solidFill>
+                  <a:srgbClr val="000000"/>
+                </a:solidFill>
+                <a:uFill>
+                  <a:solidFill>
+                    <a:srgbClr val="ffffff"/>
+                  </a:solidFill>
+                </a:uFill>
+                <a:latin typeface="Arial"/>
+              </a:rPr>
+              <a:t>Muro sul piano y</a:t>
+            </a:r>
+            <a:endParaRPr b="0" lang="it-IT" sz="4400" spc="-1" strike="noStrike">
+              <a:solidFill>
+                <a:srgbClr val="000000"/>
+              </a:solidFill>
+              <a:uFill>
+                <a:solidFill>
+                  <a:srgbClr val="ffffff"/>
+                </a:solidFill>
+              </a:uFill>
+              <a:latin typeface="Arial"/>
+            </a:endParaRPr>
+          </a:p>
+        </p:txBody>
+      </p:sp>
     </p:spTree>
   </p:cSld>
   <p:timing>
@@ -2383,6 +2523,129 @@
           <p:childTnLst>
             <p:seq>
               <p:cTn id="8" nodeType="mainSeq"/>
+              <p:prevCondLst>
+                <p:cond delay="0" evt="onPrev">
+                  <p:tgtEl>
+                    <p:sldTgt/>
+                  </p:tgtEl>
+                </p:cond>
+              </p:prevCondLst>
+              <p:nextCondLst>
+                <p:cond delay="0" evt="onNext">
+                  <p:tgtEl>
+                    <p:sldTgt/>
+                  </p:tgtEl>
+                </p:cond>
+              </p:nextCondLst>
+            </p:seq>
+          </p:childTnLst>
+        </p:cTn>
+      </p:par>
+    </p:tnLst>
+  </p:timing>
+</p:sld>
+</file>
+
+<file path=ppt/slides/slide5.xml><?xml version="1.0" encoding="utf-8"?>
+<p:sld xmlns:a="http://schemas.openxmlformats.org/drawingml/2006/main" xmlns:p="http://schemas.openxmlformats.org/presentationml/2006/main" xmlns:r="http://schemas.openxmlformats.org/officeDocument/2006/relationships" xmlns:p14="http://schemas.microsoft.com/office/powerpoint/2010/main" xmlns:p15="http://schemas.microsoft.com/office/powerpoint/2012/main" xmlns:mc="http://schemas.openxmlformats.org/markup-compatibility/2006">
+  <p:cSld>
+    <p:spTree>
+      <p:nvGrpSpPr>
+        <p:cNvPr id="1" name=""/>
+        <p:cNvGrpSpPr/>
+        <p:nvPr/>
+      </p:nvGrpSpPr>
+      <p:grpSpPr>
+        <a:xfrm>
+          <a:off x="0" y="0"/>
+          <a:ext cx="0" cy="0"/>
+          <a:chOff x="0" y="0"/>
+          <a:chExt cx="0" cy="0"/>
+        </a:xfrm>
+      </p:grpSpPr>
+      <p:pic>
+        <p:nvPicPr>
+          <p:cNvPr id="47" name="" descr=""/>
+          <p:cNvPicPr/>
+          <p:nvPr/>
+        </p:nvPicPr>
+        <p:blipFill>
+          <a:blip r:embed="rId1"/>
+          <a:stretch/>
+        </p:blipFill>
+        <p:spPr>
+          <a:xfrm>
+            <a:off x="2341800" y="1660680"/>
+            <a:ext cx="5304240" cy="5575320"/>
+          </a:xfrm>
+          <a:prstGeom prst="rect">
+            <a:avLst/>
+          </a:prstGeom>
+          <a:ln>
+            <a:noFill/>
+          </a:ln>
+        </p:spPr>
+      </p:pic>
+      <p:sp>
+        <p:nvSpPr>
+          <p:cNvPr id="48" name="TextShape 1"/>
+          <p:cNvSpPr txBox="1"/>
+          <p:nvPr/>
+        </p:nvSpPr>
+        <p:spPr>
+          <a:xfrm>
+            <a:off x="504000" y="301320"/>
+            <a:ext cx="9071640" cy="1262160"/>
+          </a:xfrm>
+          <a:prstGeom prst="rect">
+            <a:avLst/>
+          </a:prstGeom>
+          <a:noFill/>
+          <a:ln>
+            <a:noFill/>
+          </a:ln>
+        </p:spPr>
+        <p:txBody>
+          <a:bodyPr lIns="0" rIns="0" tIns="0" bIns="0" anchor="ctr"/>
+          <a:p>
+            <a:pPr algn="ctr"/>
+            <a:r>
+              <a:rPr b="0" lang="it-IT" sz="4400" spc="-1" strike="noStrike">
+                <a:solidFill>
+                  <a:srgbClr val="000000"/>
+                </a:solidFill>
+                <a:uFill>
+                  <a:solidFill>
+                    <a:srgbClr val="ffffff"/>
+                  </a:solidFill>
+                </a:uFill>
+                <a:latin typeface="Arial"/>
+              </a:rPr>
+              <a:t>Parallelepipedo di blocchi</a:t>
+            </a:r>
+            <a:endParaRPr b="0" lang="it-IT" sz="4400" spc="-1" strike="noStrike">
+              <a:solidFill>
+                <a:srgbClr val="000000"/>
+              </a:solidFill>
+              <a:uFill>
+                <a:solidFill>
+                  <a:srgbClr val="ffffff"/>
+                </a:solidFill>
+              </a:uFill>
+              <a:latin typeface="Arial"/>
+            </a:endParaRPr>
+          </a:p>
+        </p:txBody>
+      </p:sp>
+    </p:spTree>
+  </p:cSld>
+  <p:timing>
+    <p:tnLst>
+      <p:par>
+        <p:cTn id="9" dur="indefinite" restart="never" nodeType="tmRoot">
+          <p:childTnLst>
+            <p:seq>
+              <p:cTn id="10" nodeType="mainSeq"/>
               <p:prevCondLst>
                 <p:cond delay="0" evt="onPrev">
                   <p:tgtEl>

</xml_diff>